<commit_message>
ensured consistency of SSA terminology
</commit_message>
<xml_diff>
--- a/ISES2023_Poster_2.0_final_v2.pptx
+++ b/ISES2023_Poster_2.0_final_v2.pptx
@@ -114,6 +114,46 @@
 
 <file path=ppt/changesInfos/changesInfo1.xml><?xml version="1.0" encoding="utf-8"?>
 <pc:chgInfo xmlns:a="http://schemas.openxmlformats.org/drawingml/2006/main" xmlns:r="http://schemas.openxmlformats.org/officeDocument/2006/relationships" xmlns:ac="http://schemas.microsoft.com/office/drawing/2013/main/command" xmlns:pc="http://schemas.microsoft.com/office/powerpoint/2013/main/command">
+  <pc:docChgLst>
+    <pc:chgData name="Stanfield, Zachary (he/him/his)" userId="1d98a897-cda8-4009-8e57-6b415415b091" providerId="ADAL" clId="{96B48095-7F0A-4A9B-8B92-DAF23904C1E0}"/>
+    <pc:docChg chg="modSld">
+      <pc:chgData name="Stanfield, Zachary (he/him/his)" userId="1d98a897-cda8-4009-8e57-6b415415b091" providerId="ADAL" clId="{96B48095-7F0A-4A9B-8B92-DAF23904C1E0}" dt="2024-04-04T19:08:58.334" v="88" actId="20577"/>
+      <pc:docMkLst>
+        <pc:docMk/>
+      </pc:docMkLst>
+      <pc:sldChg chg="modSp mod">
+        <pc:chgData name="Stanfield, Zachary (he/him/his)" userId="1d98a897-cda8-4009-8e57-6b415415b091" providerId="ADAL" clId="{96B48095-7F0A-4A9B-8B92-DAF23904C1E0}" dt="2024-04-04T19:08:58.334" v="88" actId="20577"/>
+        <pc:sldMkLst>
+          <pc:docMk/>
+          <pc:sldMk cId="2310593666" sldId="256"/>
+        </pc:sldMkLst>
+        <pc:spChg chg="mod">
+          <ac:chgData name="Stanfield, Zachary (he/him/his)" userId="1d98a897-cda8-4009-8e57-6b415415b091" providerId="ADAL" clId="{96B48095-7F0A-4A9B-8B92-DAF23904C1E0}" dt="2024-04-04T19:08:30.519" v="30" actId="255"/>
+          <ac:spMkLst>
+            <pc:docMk/>
+            <pc:sldMk cId="2310593666" sldId="256"/>
+            <ac:spMk id="8" creationId="{BA2293A8-836D-9B11-1DDC-B0E465202FF6}"/>
+          </ac:spMkLst>
+        </pc:spChg>
+        <pc:spChg chg="mod">
+          <ac:chgData name="Stanfield, Zachary (he/him/his)" userId="1d98a897-cda8-4009-8e57-6b415415b091" providerId="ADAL" clId="{96B48095-7F0A-4A9B-8B92-DAF23904C1E0}" dt="2024-04-04T19:08:42.600" v="59" actId="20577"/>
+          <ac:spMkLst>
+            <pc:docMk/>
+            <pc:sldMk cId="2310593666" sldId="256"/>
+            <ac:spMk id="22" creationId="{F6EB2766-EB1D-F58A-9CF6-7EA130248806}"/>
+          </ac:spMkLst>
+        </pc:spChg>
+        <pc:spChg chg="mod">
+          <ac:chgData name="Stanfield, Zachary (he/him/his)" userId="1d98a897-cda8-4009-8e57-6b415415b091" providerId="ADAL" clId="{96B48095-7F0A-4A9B-8B92-DAF23904C1E0}" dt="2024-04-04T19:08:58.334" v="88" actId="20577"/>
+          <ac:spMkLst>
+            <pc:docMk/>
+            <pc:sldMk cId="2310593666" sldId="256"/>
+            <ac:spMk id="40" creationId="{65CEEE19-2628-2BD6-5E4F-4CA6A6C2DBCE}"/>
+          </ac:spMkLst>
+        </pc:spChg>
+      </pc:sldChg>
+    </pc:docChg>
+  </pc:docChgLst>
   <pc:docChgLst>
     <pc:chgData name="Stanfield, Zachary (he/him/his)" userId="1d98a897-cda8-4009-8e57-6b415415b091" providerId="ADAL" clId="{17257E00-C16F-4CAB-A7C5-A5030FF36E6E}"/>
     <pc:docChg chg="undo custSel modSld">
@@ -672,7 +712,7 @@
           <a:p>
             <a:fld id="{C3095D32-C0A8-4907-9740-118F6B6D2B11}" type="datetimeFigureOut">
               <a:rPr lang="en-US" smtClean="0"/>
-              <a:t>8/22/2023</a:t>
+              <a:t>4/4/2024</a:t>
             </a:fld>
             <a:endParaRPr lang="en-US"/>
           </a:p>
@@ -842,7 +882,7 @@
           <a:p>
             <a:fld id="{C3095D32-C0A8-4907-9740-118F6B6D2B11}" type="datetimeFigureOut">
               <a:rPr lang="en-US" smtClean="0"/>
-              <a:t>8/22/2023</a:t>
+              <a:t>4/4/2024</a:t>
             </a:fld>
             <a:endParaRPr lang="en-US"/>
           </a:p>
@@ -1022,7 +1062,7 @@
           <a:p>
             <a:fld id="{C3095D32-C0A8-4907-9740-118F6B6D2B11}" type="datetimeFigureOut">
               <a:rPr lang="en-US" smtClean="0"/>
-              <a:t>8/22/2023</a:t>
+              <a:t>4/4/2024</a:t>
             </a:fld>
             <a:endParaRPr lang="en-US"/>
           </a:p>
@@ -1192,7 +1232,7 @@
           <a:p>
             <a:fld id="{C3095D32-C0A8-4907-9740-118F6B6D2B11}" type="datetimeFigureOut">
               <a:rPr lang="en-US" smtClean="0"/>
-              <a:t>8/22/2023</a:t>
+              <a:t>4/4/2024</a:t>
             </a:fld>
             <a:endParaRPr lang="en-US"/>
           </a:p>
@@ -1436,7 +1476,7 @@
           <a:p>
             <a:fld id="{C3095D32-C0A8-4907-9740-118F6B6D2B11}" type="datetimeFigureOut">
               <a:rPr lang="en-US" smtClean="0"/>
-              <a:t>8/22/2023</a:t>
+              <a:t>4/4/2024</a:t>
             </a:fld>
             <a:endParaRPr lang="en-US"/>
           </a:p>
@@ -1668,7 +1708,7 @@
           <a:p>
             <a:fld id="{C3095D32-C0A8-4907-9740-118F6B6D2B11}" type="datetimeFigureOut">
               <a:rPr lang="en-US" smtClean="0"/>
-              <a:t>8/22/2023</a:t>
+              <a:t>4/4/2024</a:t>
             </a:fld>
             <a:endParaRPr lang="en-US"/>
           </a:p>
@@ -2035,7 +2075,7 @@
           <a:p>
             <a:fld id="{C3095D32-C0A8-4907-9740-118F6B6D2B11}" type="datetimeFigureOut">
               <a:rPr lang="en-US" smtClean="0"/>
-              <a:t>8/22/2023</a:t>
+              <a:t>4/4/2024</a:t>
             </a:fld>
             <a:endParaRPr lang="en-US"/>
           </a:p>
@@ -2153,7 +2193,7 @@
           <a:p>
             <a:fld id="{C3095D32-C0A8-4907-9740-118F6B6D2B11}" type="datetimeFigureOut">
               <a:rPr lang="en-US" smtClean="0"/>
-              <a:t>8/22/2023</a:t>
+              <a:t>4/4/2024</a:t>
             </a:fld>
             <a:endParaRPr lang="en-US"/>
           </a:p>
@@ -2248,7 +2288,7 @@
           <a:p>
             <a:fld id="{C3095D32-C0A8-4907-9740-118F6B6D2B11}" type="datetimeFigureOut">
               <a:rPr lang="en-US" smtClean="0"/>
-              <a:t>8/22/2023</a:t>
+              <a:t>4/4/2024</a:t>
             </a:fld>
             <a:endParaRPr lang="en-US"/>
           </a:p>
@@ -2525,7 +2565,7 @@
           <a:p>
             <a:fld id="{C3095D32-C0A8-4907-9740-118F6B6D2B11}" type="datetimeFigureOut">
               <a:rPr lang="en-US" smtClean="0"/>
-              <a:t>8/22/2023</a:t>
+              <a:t>4/4/2024</a:t>
             </a:fld>
             <a:endParaRPr lang="en-US"/>
           </a:p>
@@ -2782,7 +2822,7 @@
           <a:p>
             <a:fld id="{C3095D32-C0A8-4907-9740-118F6B6D2B11}" type="datetimeFigureOut">
               <a:rPr lang="en-US" smtClean="0"/>
-              <a:t>8/22/2023</a:t>
+              <a:t>4/4/2024</a:t>
             </a:fld>
             <a:endParaRPr lang="en-US"/>
           </a:p>
@@ -2995,7 +3035,7 @@
           <a:p>
             <a:fld id="{C3095D32-C0A8-4907-9740-118F6B6D2B11}" type="datetimeFigureOut">
               <a:rPr lang="en-US" smtClean="0"/>
-              <a:t>8/22/2023</a:t>
+              <a:t>4/4/2024</a:t>
             </a:fld>
             <a:endParaRPr lang="en-US"/>
           </a:p>
@@ -3840,7 +3880,7 @@
         <p:spPr>
           <a:xfrm>
             <a:off x="5486400" y="269509"/>
-            <a:ext cx="21945600" cy="2616101"/>
+            <a:ext cx="21945600" cy="2492990"/>
           </a:xfrm>
           <a:prstGeom prst="rect">
             <a:avLst/>
@@ -3855,12 +3895,12 @@
           <a:p>
             <a:pPr algn="ctr"/>
             <a:r>
-              <a:rPr lang="en-US" sz="8200" dirty="0">
+              <a:rPr lang="en-US" sz="7800" dirty="0">
                 <a:solidFill>
                   <a:schemeClr val="bg1"/>
                 </a:solidFill>
               </a:rPr>
-              <a:t>Developing Chemical Signatures for 5 Categories of Household Products Using Non-Targeted Analysis</a:t>
+              <a:t>Developing Chemical Signatures for 5 Categories of Household Products Using Suspect Screening Analysis</a:t>
             </a:r>
           </a:p>
         </p:txBody>
@@ -4784,12 +4824,20 @@
             </a:pPr>
             <a:r>
               <a:rPr lang="en-US" sz="3400" dirty="0">
+                <a:latin typeface="Calibri" panose="020F0502020204030204" pitchFamily="34" charset="0"/>
+                <a:ea typeface="Calibri" panose="020F0502020204030204" pitchFamily="34" charset="0"/>
+                <a:cs typeface="Times New Roman" panose="02020603050405020304" pitchFamily="18" charset="0"/>
+              </a:rPr>
+              <a:t>Suspect screening</a:t>
+            </a:r>
+            <a:r>
+              <a:rPr lang="en-US" sz="3400" dirty="0">
                 <a:effectLst/>
                 <a:latin typeface="Calibri" panose="020F0502020204030204" pitchFamily="34" charset="0"/>
                 <a:ea typeface="Calibri" panose="020F0502020204030204" pitchFamily="34" charset="0"/>
                 <a:cs typeface="Times New Roman" panose="02020603050405020304" pitchFamily="18" charset="0"/>
               </a:rPr>
-              <a:t>Non-targeted analysis (NTA) using two-dimensional gas chromatography time-of-flight mass spectrometry (GC x GC-TOFMS) was applied to 170 unique samples of selected consumer products from 5 categories.</a:t>
+              <a:t> analysis (NTA) using two-dimensional gas chromatography time-of-flight mass spectrometry (GC x GC-TOFMS) was applied to 170 unique samples of selected consumer products from 5 categories.</a:t>
             </a:r>
             <a:endParaRPr lang="en-US" sz="3400" dirty="0"/>
           </a:p>
@@ -4998,7 +5046,7 @@
             </a:r>
             <a:r>
               <a:rPr lang="en-US" sz="2800" dirty="0"/>
-              <a:t>Workflow of non-targeted analysis of products from 5 types of household consumer products. Products were extracted with dichloromethane (DCM). After addition of an internal standard, each extraction was analyzed via GC X GC-TOFMS to obtain its mass spectra. The spectra were matched to the 2017 NIST database and analytical standards were used to confirm a subset of the chemical identifications. Chemicals were annotated by reported or predicted functional uses</a:t>
+              <a:t>Workflow of suspect screening analysis of products from 5 types of household consumer products. Products were extracted with dichloromethane (DCM). After addition of an internal standard, each extraction was analyzed via GC X GC-TOFMS to obtain its mass spectra. The spectra were matched to the 2017 NIST database and analytical standards were used to confirm a subset of the chemical identifications. Chemicals were annotated by reported or predicted functional uses</a:t>
             </a:r>
             <a:r>
               <a:rPr lang="en-US" sz="2800" baseline="30000" dirty="0"/>

</xml_diff>